<commit_message>
qa change actor names in text and figures, cap statements
</commit_message>
<xml_diff>
--- a/source/pages/assets/images/source/framerwork_interactions.pptx
+++ b/source/pages/assets/images/source/framerwork_interactions.pptx
@@ -6,6 +6,12 @@
   </p:sldMasterIdLst>
   <p:sldIdLst>
     <p:sldId id="256" r:id="rId2"/>
+    <p:sldId id="257" r:id="rId3"/>
+    <p:sldId id="258" r:id="rId4"/>
+    <p:sldId id="259" r:id="rId5"/>
+    <p:sldId id="260" r:id="rId6"/>
+    <p:sldId id="261" r:id="rId7"/>
+    <p:sldId id="262" r:id="rId8"/>
   </p:sldIdLst>
   <p:sldSz cx="7345363" cy="1828800"/>
   <p:notesSz cx="6858000" cy="9144000"/>
@@ -243,7 +249,7 @@
           <a:p>
             <a:fld id="{8915D0CF-E652-5D47-A697-54CCDB718F90}" type="datetimeFigureOut">
               <a:rPr lang="en-US" smtClean="0"/>
-              <a:t>3/11/19</a:t>
+              <a:t>3/14/19</a:t>
             </a:fld>
             <a:endParaRPr lang="en-US"/>
           </a:p>
@@ -413,7 +419,7 @@
           <a:p>
             <a:fld id="{8915D0CF-E652-5D47-A697-54CCDB718F90}" type="datetimeFigureOut">
               <a:rPr lang="en-US" smtClean="0"/>
-              <a:t>3/11/19</a:t>
+              <a:t>3/14/19</a:t>
             </a:fld>
             <a:endParaRPr lang="en-US"/>
           </a:p>
@@ -593,7 +599,7 @@
           <a:p>
             <a:fld id="{8915D0CF-E652-5D47-A697-54CCDB718F90}" type="datetimeFigureOut">
               <a:rPr lang="en-US" smtClean="0"/>
-              <a:t>3/11/19</a:t>
+              <a:t>3/14/19</a:t>
             </a:fld>
             <a:endParaRPr lang="en-US"/>
           </a:p>
@@ -763,7 +769,7 @@
           <a:p>
             <a:fld id="{8915D0CF-E652-5D47-A697-54CCDB718F90}" type="datetimeFigureOut">
               <a:rPr lang="en-US" smtClean="0"/>
-              <a:t>3/11/19</a:t>
+              <a:t>3/14/19</a:t>
             </a:fld>
             <a:endParaRPr lang="en-US"/>
           </a:p>
@@ -1009,7 +1015,7 @@
           <a:p>
             <a:fld id="{8915D0CF-E652-5D47-A697-54CCDB718F90}" type="datetimeFigureOut">
               <a:rPr lang="en-US" smtClean="0"/>
-              <a:t>3/11/19</a:t>
+              <a:t>3/14/19</a:t>
             </a:fld>
             <a:endParaRPr lang="en-US"/>
           </a:p>
@@ -1241,7 +1247,7 @@
           <a:p>
             <a:fld id="{8915D0CF-E652-5D47-A697-54CCDB718F90}" type="datetimeFigureOut">
               <a:rPr lang="en-US" smtClean="0"/>
-              <a:t>3/11/19</a:t>
+              <a:t>3/14/19</a:t>
             </a:fld>
             <a:endParaRPr lang="en-US"/>
           </a:p>
@@ -1608,7 +1614,7 @@
           <a:p>
             <a:fld id="{8915D0CF-E652-5D47-A697-54CCDB718F90}" type="datetimeFigureOut">
               <a:rPr lang="en-US" smtClean="0"/>
-              <a:t>3/11/19</a:t>
+              <a:t>3/14/19</a:t>
             </a:fld>
             <a:endParaRPr lang="en-US"/>
           </a:p>
@@ -1726,7 +1732,7 @@
           <a:p>
             <a:fld id="{8915D0CF-E652-5D47-A697-54CCDB718F90}" type="datetimeFigureOut">
               <a:rPr lang="en-US" smtClean="0"/>
-              <a:t>3/11/19</a:t>
+              <a:t>3/14/19</a:t>
             </a:fld>
             <a:endParaRPr lang="en-US"/>
           </a:p>
@@ -1821,7 +1827,7 @@
           <a:p>
             <a:fld id="{8915D0CF-E652-5D47-A697-54CCDB718F90}" type="datetimeFigureOut">
               <a:rPr lang="en-US" smtClean="0"/>
-              <a:t>3/11/19</a:t>
+              <a:t>3/14/19</a:t>
             </a:fld>
             <a:endParaRPr lang="en-US"/>
           </a:p>
@@ -2098,7 +2104,7 @@
           <a:p>
             <a:fld id="{8915D0CF-E652-5D47-A697-54CCDB718F90}" type="datetimeFigureOut">
               <a:rPr lang="en-US" smtClean="0"/>
-              <a:t>3/11/19</a:t>
+              <a:t>3/14/19</a:t>
             </a:fld>
             <a:endParaRPr lang="en-US"/>
           </a:p>
@@ -2355,7 +2361,7 @@
           <a:p>
             <a:fld id="{8915D0CF-E652-5D47-A697-54CCDB718F90}" type="datetimeFigureOut">
               <a:rPr lang="en-US" smtClean="0"/>
-              <a:t>3/11/19</a:t>
+              <a:t>3/14/19</a:t>
             </a:fld>
             <a:endParaRPr lang="en-US"/>
           </a:p>
@@ -2568,7 +2574,7 @@
           <a:p>
             <a:fld id="{8915D0CF-E652-5D47-A697-54CCDB718F90}" type="datetimeFigureOut">
               <a:rPr lang="en-US" smtClean="0"/>
-              <a:t>3/11/19</a:t>
+              <a:t>3/14/19</a:t>
             </a:fld>
             <a:endParaRPr lang="en-US"/>
           </a:p>
@@ -3017,7 +3023,7 @@
             <a:pPr algn="ctr"/>
             <a:r>
               <a:rPr lang="en-US" dirty="0"/>
-              <a:t>Aggregator</a:t>
+              <a:t>Reporter</a:t>
             </a:r>
           </a:p>
         </p:txBody>
@@ -3143,7 +3149,7 @@
             <a:pPr algn="ctr"/>
             <a:r>
               <a:rPr lang="en-US" dirty="0"/>
-              <a:t>Post Individual Summary Report</a:t>
+              <a:t>Post Individual  Report</a:t>
             </a:r>
           </a:p>
         </p:txBody>
@@ -3152,6 +3158,1657 @@
     <p:extLst>
       <p:ext uri="{BB962C8B-B14F-4D97-AF65-F5344CB8AC3E}">
         <p14:creationId xmlns:p14="http://schemas.microsoft.com/office/powerpoint/2010/main" val="2972009276"/>
+      </p:ext>
+    </p:extLst>
+  </p:cSld>
+  <p:clrMapOvr>
+    <a:masterClrMapping/>
+  </p:clrMapOvr>
+</p:sld>
+</file>
+
+<file path=ppt/slides/slide2.xml><?xml version="1.0" encoding="utf-8"?>
+<p:sld xmlns:a="http://schemas.openxmlformats.org/drawingml/2006/main" xmlns:r="http://schemas.openxmlformats.org/officeDocument/2006/relationships" xmlns:p="http://schemas.openxmlformats.org/presentationml/2006/main">
+  <p:cSld>
+    <p:spTree>
+      <p:nvGrpSpPr>
+        <p:cNvPr id="1" name=""/>
+        <p:cNvGrpSpPr/>
+        <p:nvPr/>
+      </p:nvGrpSpPr>
+      <p:grpSpPr>
+        <a:xfrm>
+          <a:off x="0" y="0"/>
+          <a:ext cx="0" cy="0"/>
+          <a:chOff x="0" y="0"/>
+          <a:chExt cx="0" cy="0"/>
+        </a:xfrm>
+      </p:grpSpPr>
+      <p:sp>
+        <p:nvSpPr>
+          <p:cNvPr id="4" name="Rounded Rectangle 3">
+            <a:extLst>
+              <a:ext uri="{FF2B5EF4-FFF2-40B4-BE49-F238E27FC236}">
+                <a16:creationId xmlns:a16="http://schemas.microsoft.com/office/drawing/2014/main" id="{A05A443F-C73B-3C4E-A56B-17CE4938DC22}"/>
+              </a:ext>
+            </a:extLst>
+          </p:cNvPr>
+          <p:cNvSpPr/>
+          <p:nvPr/>
+        </p:nvSpPr>
+        <p:spPr>
+          <a:xfrm>
+            <a:off x="910424" y="548640"/>
+            <a:ext cx="1439876" cy="731520"/>
+          </a:xfrm>
+          <a:prstGeom prst="roundRect">
+            <a:avLst/>
+          </a:prstGeom>
+        </p:spPr>
+        <p:style>
+          <a:lnRef idx="2">
+            <a:schemeClr val="accent5">
+              <a:shade val="50000"/>
+            </a:schemeClr>
+          </a:lnRef>
+          <a:fillRef idx="1">
+            <a:schemeClr val="accent5"/>
+          </a:fillRef>
+          <a:effectRef idx="0">
+            <a:schemeClr val="accent5"/>
+          </a:effectRef>
+          <a:fontRef idx="minor">
+            <a:schemeClr val="lt1"/>
+          </a:fontRef>
+        </p:style>
+        <p:txBody>
+          <a:bodyPr rtlCol="0" anchor="ctr"/>
+          <a:lstStyle/>
+          <a:p>
+            <a:pPr algn="ctr"/>
+            <a:r>
+              <a:rPr lang="en-US" dirty="0"/>
+              <a:t>Reporter</a:t>
+            </a:r>
+          </a:p>
+        </p:txBody>
+      </p:sp>
+      <p:sp>
+        <p:nvSpPr>
+          <p:cNvPr id="5" name="Rounded Rectangle 4">
+            <a:extLst>
+              <a:ext uri="{FF2B5EF4-FFF2-40B4-BE49-F238E27FC236}">
+                <a16:creationId xmlns:a16="http://schemas.microsoft.com/office/drawing/2014/main" id="{D4BB50DF-3901-5349-8E31-9DFE5D280A4C}"/>
+              </a:ext>
+            </a:extLst>
+          </p:cNvPr>
+          <p:cNvSpPr/>
+          <p:nvPr/>
+        </p:nvSpPr>
+        <p:spPr>
+          <a:xfrm>
+            <a:off x="4937760" y="548640"/>
+            <a:ext cx="1439876" cy="731520"/>
+          </a:xfrm>
+          <a:prstGeom prst="roundRect">
+            <a:avLst/>
+          </a:prstGeom>
+        </p:spPr>
+        <p:style>
+          <a:lnRef idx="2">
+            <a:schemeClr val="accent5">
+              <a:shade val="50000"/>
+            </a:schemeClr>
+          </a:lnRef>
+          <a:fillRef idx="1">
+            <a:schemeClr val="accent5"/>
+          </a:fillRef>
+          <a:effectRef idx="0">
+            <a:schemeClr val="accent5"/>
+          </a:effectRef>
+          <a:fontRef idx="minor">
+            <a:schemeClr val="lt1"/>
+          </a:fontRef>
+        </p:style>
+        <p:txBody>
+          <a:bodyPr rtlCol="0" anchor="ctr"/>
+          <a:lstStyle/>
+          <a:p>
+            <a:pPr algn="ctr"/>
+            <a:r>
+              <a:rPr lang="en-US" dirty="0"/>
+              <a:t>Receiver</a:t>
+            </a:r>
+          </a:p>
+        </p:txBody>
+      </p:sp>
+      <p:cxnSp>
+        <p:nvCxnSpPr>
+          <p:cNvPr id="7" name="Straight Arrow Connector 6">
+            <a:extLst>
+              <a:ext uri="{FF2B5EF4-FFF2-40B4-BE49-F238E27FC236}">
+                <a16:creationId xmlns:a16="http://schemas.microsoft.com/office/drawing/2014/main" id="{E55F4871-6783-394B-BD80-7A2ADA301F18}"/>
+              </a:ext>
+            </a:extLst>
+          </p:cNvPr>
+          <p:cNvCxnSpPr>
+            <a:cxnSpLocks/>
+          </p:cNvCxnSpPr>
+          <p:nvPr/>
+        </p:nvCxnSpPr>
+        <p:spPr>
+          <a:xfrm>
+            <a:off x="2511975" y="947279"/>
+            <a:ext cx="2320684" cy="0"/>
+          </a:xfrm>
+          <a:prstGeom prst="straightConnector1">
+            <a:avLst/>
+          </a:prstGeom>
+          <a:ln w="63500">
+            <a:tailEnd type="triangle"/>
+          </a:ln>
+        </p:spPr>
+        <p:style>
+          <a:lnRef idx="3">
+            <a:schemeClr val="dk1"/>
+          </a:lnRef>
+          <a:fillRef idx="0">
+            <a:schemeClr val="dk1"/>
+          </a:fillRef>
+          <a:effectRef idx="2">
+            <a:schemeClr val="dk1"/>
+          </a:effectRef>
+          <a:fontRef idx="minor">
+            <a:schemeClr val="tx1"/>
+          </a:fontRef>
+        </p:style>
+      </p:cxnSp>
+      <p:sp>
+        <p:nvSpPr>
+          <p:cNvPr id="9" name="TextBox 8">
+            <a:extLst>
+              <a:ext uri="{FF2B5EF4-FFF2-40B4-BE49-F238E27FC236}">
+                <a16:creationId xmlns:a16="http://schemas.microsoft.com/office/drawing/2014/main" id="{78938667-68DC-824C-BFCC-43F9EE407867}"/>
+              </a:ext>
+            </a:extLst>
+          </p:cNvPr>
+          <p:cNvSpPr txBox="1"/>
+          <p:nvPr/>
+        </p:nvSpPr>
+        <p:spPr>
+          <a:xfrm>
+            <a:off x="2743200" y="283700"/>
+            <a:ext cx="1797269" cy="646331"/>
+          </a:xfrm>
+          <a:prstGeom prst="rect">
+            <a:avLst/>
+          </a:prstGeom>
+          <a:noFill/>
+        </p:spPr>
+        <p:txBody>
+          <a:bodyPr wrap="square" rtlCol="0">
+            <a:spAutoFit/>
+          </a:bodyPr>
+          <a:lstStyle/>
+          <a:p>
+            <a:pPr algn="ctr"/>
+            <a:r>
+              <a:rPr lang="en-US" dirty="0"/>
+              <a:t>Post Summary Report</a:t>
+            </a:r>
+          </a:p>
+        </p:txBody>
+      </p:sp>
+    </p:spTree>
+    <p:extLst>
+      <p:ext uri="{BB962C8B-B14F-4D97-AF65-F5344CB8AC3E}">
+        <p14:creationId xmlns:p14="http://schemas.microsoft.com/office/powerpoint/2010/main" val="1473835190"/>
+      </p:ext>
+    </p:extLst>
+  </p:cSld>
+  <p:clrMapOvr>
+    <a:masterClrMapping/>
+  </p:clrMapOvr>
+</p:sld>
+</file>
+
+<file path=ppt/slides/slide3.xml><?xml version="1.0" encoding="utf-8"?>
+<p:sld xmlns:a="http://schemas.openxmlformats.org/drawingml/2006/main" xmlns:r="http://schemas.openxmlformats.org/officeDocument/2006/relationships" xmlns:p="http://schemas.openxmlformats.org/presentationml/2006/main">
+  <p:cSld>
+    <p:spTree>
+      <p:nvGrpSpPr>
+        <p:cNvPr id="1" name=""/>
+        <p:cNvGrpSpPr/>
+        <p:nvPr/>
+      </p:nvGrpSpPr>
+      <p:grpSpPr>
+        <a:xfrm>
+          <a:off x="0" y="0"/>
+          <a:ext cx="0" cy="0"/>
+          <a:chOff x="0" y="0"/>
+          <a:chExt cx="0" cy="0"/>
+        </a:xfrm>
+      </p:grpSpPr>
+      <p:sp>
+        <p:nvSpPr>
+          <p:cNvPr id="4" name="Rounded Rectangle 3">
+            <a:extLst>
+              <a:ext uri="{FF2B5EF4-FFF2-40B4-BE49-F238E27FC236}">
+                <a16:creationId xmlns:a16="http://schemas.microsoft.com/office/drawing/2014/main" id="{A05A443F-C73B-3C4E-A56B-17CE4938DC22}"/>
+              </a:ext>
+            </a:extLst>
+          </p:cNvPr>
+          <p:cNvSpPr/>
+          <p:nvPr/>
+        </p:nvSpPr>
+        <p:spPr>
+          <a:xfrm>
+            <a:off x="910424" y="548640"/>
+            <a:ext cx="1439876" cy="731520"/>
+          </a:xfrm>
+          <a:prstGeom prst="roundRect">
+            <a:avLst/>
+          </a:prstGeom>
+        </p:spPr>
+        <p:style>
+          <a:lnRef idx="2">
+            <a:schemeClr val="accent5">
+              <a:shade val="50000"/>
+            </a:schemeClr>
+          </a:lnRef>
+          <a:fillRef idx="1">
+            <a:schemeClr val="accent5"/>
+          </a:fillRef>
+          <a:effectRef idx="0">
+            <a:schemeClr val="accent5"/>
+          </a:effectRef>
+          <a:fontRef idx="minor">
+            <a:schemeClr val="lt1"/>
+          </a:fontRef>
+        </p:style>
+        <p:txBody>
+          <a:bodyPr rtlCol="0" anchor="ctr"/>
+          <a:lstStyle/>
+          <a:p>
+            <a:pPr algn="ctr"/>
+            <a:r>
+              <a:rPr lang="en-US" dirty="0"/>
+              <a:t>Producer</a:t>
+            </a:r>
+          </a:p>
+        </p:txBody>
+      </p:sp>
+      <p:sp>
+        <p:nvSpPr>
+          <p:cNvPr id="5" name="Rounded Rectangle 4">
+            <a:extLst>
+              <a:ext uri="{FF2B5EF4-FFF2-40B4-BE49-F238E27FC236}">
+                <a16:creationId xmlns:a16="http://schemas.microsoft.com/office/drawing/2014/main" id="{D4BB50DF-3901-5349-8E31-9DFE5D280A4C}"/>
+              </a:ext>
+            </a:extLst>
+          </p:cNvPr>
+          <p:cNvSpPr/>
+          <p:nvPr/>
+        </p:nvSpPr>
+        <p:spPr>
+          <a:xfrm>
+            <a:off x="4937760" y="548640"/>
+            <a:ext cx="1439876" cy="731520"/>
+          </a:xfrm>
+          <a:prstGeom prst="roundRect">
+            <a:avLst/>
+          </a:prstGeom>
+        </p:spPr>
+        <p:style>
+          <a:lnRef idx="2">
+            <a:schemeClr val="accent5">
+              <a:shade val="50000"/>
+            </a:schemeClr>
+          </a:lnRef>
+          <a:fillRef idx="1">
+            <a:schemeClr val="accent5"/>
+          </a:fillRef>
+          <a:effectRef idx="0">
+            <a:schemeClr val="accent5"/>
+          </a:effectRef>
+          <a:fontRef idx="minor">
+            <a:schemeClr val="lt1"/>
+          </a:fontRef>
+        </p:style>
+        <p:txBody>
+          <a:bodyPr rtlCol="0" anchor="ctr"/>
+          <a:lstStyle/>
+          <a:p>
+            <a:pPr algn="ctr"/>
+            <a:r>
+              <a:rPr lang="en-US" dirty="0"/>
+              <a:t>Consumer</a:t>
+            </a:r>
+          </a:p>
+        </p:txBody>
+      </p:sp>
+      <p:cxnSp>
+        <p:nvCxnSpPr>
+          <p:cNvPr id="7" name="Straight Arrow Connector 6">
+            <a:extLst>
+              <a:ext uri="{FF2B5EF4-FFF2-40B4-BE49-F238E27FC236}">
+                <a16:creationId xmlns:a16="http://schemas.microsoft.com/office/drawing/2014/main" id="{E55F4871-6783-394B-BD80-7A2ADA301F18}"/>
+              </a:ext>
+            </a:extLst>
+          </p:cNvPr>
+          <p:cNvCxnSpPr>
+            <a:cxnSpLocks/>
+          </p:cNvCxnSpPr>
+          <p:nvPr/>
+        </p:nvCxnSpPr>
+        <p:spPr>
+          <a:xfrm>
+            <a:off x="2512339" y="808291"/>
+            <a:ext cx="2320684" cy="0"/>
+          </a:xfrm>
+          <a:prstGeom prst="straightConnector1">
+            <a:avLst/>
+          </a:prstGeom>
+          <a:ln w="63500">
+            <a:tailEnd type="triangle"/>
+          </a:ln>
+        </p:spPr>
+        <p:style>
+          <a:lnRef idx="3">
+            <a:schemeClr val="dk1"/>
+          </a:lnRef>
+          <a:fillRef idx="0">
+            <a:schemeClr val="dk1"/>
+          </a:fillRef>
+          <a:effectRef idx="2">
+            <a:schemeClr val="dk1"/>
+          </a:effectRef>
+          <a:fontRef idx="minor">
+            <a:schemeClr val="tx1"/>
+          </a:fontRef>
+        </p:style>
+      </p:cxnSp>
+      <p:sp>
+        <p:nvSpPr>
+          <p:cNvPr id="9" name="TextBox 8">
+            <a:extLst>
+              <a:ext uri="{FF2B5EF4-FFF2-40B4-BE49-F238E27FC236}">
+                <a16:creationId xmlns:a16="http://schemas.microsoft.com/office/drawing/2014/main" id="{78938667-68DC-824C-BFCC-43F9EE407867}"/>
+              </a:ext>
+            </a:extLst>
+          </p:cNvPr>
+          <p:cNvSpPr txBox="1"/>
+          <p:nvPr/>
+        </p:nvSpPr>
+        <p:spPr>
+          <a:xfrm>
+            <a:off x="2743200" y="108140"/>
+            <a:ext cx="1797269" cy="646331"/>
+          </a:xfrm>
+          <a:prstGeom prst="rect">
+            <a:avLst/>
+          </a:prstGeom>
+          <a:noFill/>
+        </p:spPr>
+        <p:txBody>
+          <a:bodyPr wrap="square" rtlCol="0">
+            <a:spAutoFit/>
+          </a:bodyPr>
+          <a:lstStyle/>
+          <a:p>
+            <a:pPr algn="ctr"/>
+            <a:r>
+              <a:rPr lang="en-US" dirty="0"/>
+              <a:t>Get CQM Data Requirements</a:t>
+            </a:r>
+          </a:p>
+        </p:txBody>
+      </p:sp>
+      <p:cxnSp>
+        <p:nvCxnSpPr>
+          <p:cNvPr id="6" name="Straight Arrow Connector 5">
+            <a:extLst>
+              <a:ext uri="{FF2B5EF4-FFF2-40B4-BE49-F238E27FC236}">
+                <a16:creationId xmlns:a16="http://schemas.microsoft.com/office/drawing/2014/main" id="{E139EF16-53B7-E144-9F8F-2BA3DB3D4F1D}"/>
+              </a:ext>
+            </a:extLst>
+          </p:cNvPr>
+          <p:cNvCxnSpPr>
+            <a:cxnSpLocks/>
+          </p:cNvCxnSpPr>
+          <p:nvPr/>
+        </p:nvCxnSpPr>
+        <p:spPr>
+          <a:xfrm>
+            <a:off x="2475764" y="1048473"/>
+            <a:ext cx="2320684" cy="0"/>
+          </a:xfrm>
+          <a:prstGeom prst="straightConnector1">
+            <a:avLst/>
+          </a:prstGeom>
+          <a:ln w="63500">
+            <a:headEnd type="triangle"/>
+            <a:tailEnd type="none"/>
+          </a:ln>
+        </p:spPr>
+        <p:style>
+          <a:lnRef idx="3">
+            <a:schemeClr val="dk1"/>
+          </a:lnRef>
+          <a:fillRef idx="0">
+            <a:schemeClr val="dk1"/>
+          </a:fillRef>
+          <a:effectRef idx="2">
+            <a:schemeClr val="dk1"/>
+          </a:effectRef>
+          <a:fontRef idx="minor">
+            <a:schemeClr val="tx1"/>
+          </a:fontRef>
+        </p:style>
+      </p:cxnSp>
+      <p:sp>
+        <p:nvSpPr>
+          <p:cNvPr id="8" name="TextBox 7">
+            <a:extLst>
+              <a:ext uri="{FF2B5EF4-FFF2-40B4-BE49-F238E27FC236}">
+                <a16:creationId xmlns:a16="http://schemas.microsoft.com/office/drawing/2014/main" id="{423168B1-82C6-3745-8220-F394426F0CF0}"/>
+              </a:ext>
+            </a:extLst>
+          </p:cNvPr>
+          <p:cNvSpPr txBox="1"/>
+          <p:nvPr/>
+        </p:nvSpPr>
+        <p:spPr>
+          <a:xfrm>
+            <a:off x="2714437" y="1153377"/>
+            <a:ext cx="1916487" cy="646331"/>
+          </a:xfrm>
+          <a:prstGeom prst="rect">
+            <a:avLst/>
+          </a:prstGeom>
+          <a:noFill/>
+        </p:spPr>
+        <p:txBody>
+          <a:bodyPr wrap="square" rtlCol="0">
+            <a:spAutoFit/>
+          </a:bodyPr>
+          <a:lstStyle/>
+          <a:p>
+            <a:pPr algn="ctr"/>
+            <a:r>
+              <a:rPr lang="en-US" dirty="0"/>
+              <a:t>Return CQM Data Requirements</a:t>
+            </a:r>
+          </a:p>
+        </p:txBody>
+      </p:sp>
+    </p:spTree>
+    <p:extLst>
+      <p:ext uri="{BB962C8B-B14F-4D97-AF65-F5344CB8AC3E}">
+        <p14:creationId xmlns:p14="http://schemas.microsoft.com/office/powerpoint/2010/main" val="2396294844"/>
+      </p:ext>
+    </p:extLst>
+  </p:cSld>
+  <p:clrMapOvr>
+    <a:masterClrMapping/>
+  </p:clrMapOvr>
+</p:sld>
+</file>
+
+<file path=ppt/slides/slide4.xml><?xml version="1.0" encoding="utf-8"?>
+<p:sld xmlns:a="http://schemas.openxmlformats.org/drawingml/2006/main" xmlns:r="http://schemas.openxmlformats.org/officeDocument/2006/relationships" xmlns:p="http://schemas.openxmlformats.org/presentationml/2006/main">
+  <p:cSld>
+    <p:spTree>
+      <p:nvGrpSpPr>
+        <p:cNvPr id="1" name=""/>
+        <p:cNvGrpSpPr/>
+        <p:nvPr/>
+      </p:nvGrpSpPr>
+      <p:grpSpPr>
+        <a:xfrm>
+          <a:off x="0" y="0"/>
+          <a:ext cx="0" cy="0"/>
+          <a:chOff x="0" y="0"/>
+          <a:chExt cx="0" cy="0"/>
+        </a:xfrm>
+      </p:grpSpPr>
+      <p:sp>
+        <p:nvSpPr>
+          <p:cNvPr id="4" name="Rounded Rectangle 3">
+            <a:extLst>
+              <a:ext uri="{FF2B5EF4-FFF2-40B4-BE49-F238E27FC236}">
+                <a16:creationId xmlns:a16="http://schemas.microsoft.com/office/drawing/2014/main" id="{A05A443F-C73B-3C4E-A56B-17CE4938DC22}"/>
+              </a:ext>
+            </a:extLst>
+          </p:cNvPr>
+          <p:cNvSpPr/>
+          <p:nvPr/>
+        </p:nvSpPr>
+        <p:spPr>
+          <a:xfrm>
+            <a:off x="910424" y="548640"/>
+            <a:ext cx="1439876" cy="731520"/>
+          </a:xfrm>
+          <a:prstGeom prst="roundRect">
+            <a:avLst/>
+          </a:prstGeom>
+        </p:spPr>
+        <p:style>
+          <a:lnRef idx="2">
+            <a:schemeClr val="accent5">
+              <a:shade val="50000"/>
+            </a:schemeClr>
+          </a:lnRef>
+          <a:fillRef idx="1">
+            <a:schemeClr val="accent5"/>
+          </a:fillRef>
+          <a:effectRef idx="0">
+            <a:schemeClr val="accent5"/>
+          </a:effectRef>
+          <a:fontRef idx="minor">
+            <a:schemeClr val="lt1"/>
+          </a:fontRef>
+        </p:style>
+        <p:txBody>
+          <a:bodyPr rtlCol="0" anchor="ctr"/>
+          <a:lstStyle/>
+          <a:p>
+            <a:pPr algn="ctr"/>
+            <a:r>
+              <a:rPr lang="en-US" dirty="0"/>
+              <a:t>Producer</a:t>
+            </a:r>
+          </a:p>
+        </p:txBody>
+      </p:sp>
+      <p:sp>
+        <p:nvSpPr>
+          <p:cNvPr id="5" name="Rounded Rectangle 4">
+            <a:extLst>
+              <a:ext uri="{FF2B5EF4-FFF2-40B4-BE49-F238E27FC236}">
+                <a16:creationId xmlns:a16="http://schemas.microsoft.com/office/drawing/2014/main" id="{D4BB50DF-3901-5349-8E31-9DFE5D280A4C}"/>
+              </a:ext>
+            </a:extLst>
+          </p:cNvPr>
+          <p:cNvSpPr/>
+          <p:nvPr/>
+        </p:nvSpPr>
+        <p:spPr>
+          <a:xfrm>
+            <a:off x="4937760" y="548640"/>
+            <a:ext cx="1439876" cy="731520"/>
+          </a:xfrm>
+          <a:prstGeom prst="roundRect">
+            <a:avLst/>
+          </a:prstGeom>
+        </p:spPr>
+        <p:style>
+          <a:lnRef idx="2">
+            <a:schemeClr val="accent5">
+              <a:shade val="50000"/>
+            </a:schemeClr>
+          </a:lnRef>
+          <a:fillRef idx="1">
+            <a:schemeClr val="accent5"/>
+          </a:fillRef>
+          <a:effectRef idx="0">
+            <a:schemeClr val="accent5"/>
+          </a:effectRef>
+          <a:fontRef idx="minor">
+            <a:schemeClr val="lt1"/>
+          </a:fontRef>
+        </p:style>
+        <p:txBody>
+          <a:bodyPr rtlCol="0" anchor="ctr"/>
+          <a:lstStyle/>
+          <a:p>
+            <a:pPr algn="ctr"/>
+            <a:r>
+              <a:rPr lang="en-US" dirty="0"/>
+              <a:t>Consumer</a:t>
+            </a:r>
+          </a:p>
+        </p:txBody>
+      </p:sp>
+      <p:cxnSp>
+        <p:nvCxnSpPr>
+          <p:cNvPr id="7" name="Straight Arrow Connector 6">
+            <a:extLst>
+              <a:ext uri="{FF2B5EF4-FFF2-40B4-BE49-F238E27FC236}">
+                <a16:creationId xmlns:a16="http://schemas.microsoft.com/office/drawing/2014/main" id="{E55F4871-6783-394B-BD80-7A2ADA301F18}"/>
+              </a:ext>
+            </a:extLst>
+          </p:cNvPr>
+          <p:cNvCxnSpPr>
+            <a:cxnSpLocks/>
+          </p:cNvCxnSpPr>
+          <p:nvPr/>
+        </p:nvCxnSpPr>
+        <p:spPr>
+          <a:xfrm>
+            <a:off x="2512339" y="808291"/>
+            <a:ext cx="2320684" cy="0"/>
+          </a:xfrm>
+          <a:prstGeom prst="straightConnector1">
+            <a:avLst/>
+          </a:prstGeom>
+          <a:ln w="63500">
+            <a:tailEnd type="triangle"/>
+          </a:ln>
+        </p:spPr>
+        <p:style>
+          <a:lnRef idx="3">
+            <a:schemeClr val="dk1"/>
+          </a:lnRef>
+          <a:fillRef idx="0">
+            <a:schemeClr val="dk1"/>
+          </a:fillRef>
+          <a:effectRef idx="2">
+            <a:schemeClr val="dk1"/>
+          </a:effectRef>
+          <a:fontRef idx="minor">
+            <a:schemeClr val="tx1"/>
+          </a:fontRef>
+        </p:style>
+      </p:cxnSp>
+      <p:sp>
+        <p:nvSpPr>
+          <p:cNvPr id="9" name="TextBox 8">
+            <a:extLst>
+              <a:ext uri="{FF2B5EF4-FFF2-40B4-BE49-F238E27FC236}">
+                <a16:creationId xmlns:a16="http://schemas.microsoft.com/office/drawing/2014/main" id="{78938667-68DC-824C-BFCC-43F9EE407867}"/>
+              </a:ext>
+            </a:extLst>
+          </p:cNvPr>
+          <p:cNvSpPr txBox="1"/>
+          <p:nvPr/>
+        </p:nvSpPr>
+        <p:spPr>
+          <a:xfrm>
+            <a:off x="2622466" y="336838"/>
+            <a:ext cx="1918003" cy="369332"/>
+          </a:xfrm>
+          <a:prstGeom prst="rect">
+            <a:avLst/>
+          </a:prstGeom>
+          <a:noFill/>
+        </p:spPr>
+        <p:txBody>
+          <a:bodyPr wrap="square" rtlCol="0">
+            <a:spAutoFit/>
+          </a:bodyPr>
+          <a:lstStyle/>
+          <a:p>
+            <a:pPr algn="ctr"/>
+            <a:r>
+              <a:rPr lang="en-US" dirty="0"/>
+              <a:t>Submit CQM Data</a:t>
+            </a:r>
+          </a:p>
+        </p:txBody>
+      </p:sp>
+      <p:cxnSp>
+        <p:nvCxnSpPr>
+          <p:cNvPr id="6" name="Straight Arrow Connector 5">
+            <a:extLst>
+              <a:ext uri="{FF2B5EF4-FFF2-40B4-BE49-F238E27FC236}">
+                <a16:creationId xmlns:a16="http://schemas.microsoft.com/office/drawing/2014/main" id="{E139EF16-53B7-E144-9F8F-2BA3DB3D4F1D}"/>
+              </a:ext>
+            </a:extLst>
+          </p:cNvPr>
+          <p:cNvCxnSpPr>
+            <a:cxnSpLocks/>
+          </p:cNvCxnSpPr>
+          <p:nvPr/>
+        </p:nvCxnSpPr>
+        <p:spPr>
+          <a:xfrm>
+            <a:off x="2475764" y="1048473"/>
+            <a:ext cx="2320684" cy="0"/>
+          </a:xfrm>
+          <a:prstGeom prst="straightConnector1">
+            <a:avLst/>
+          </a:prstGeom>
+          <a:ln w="63500">
+            <a:headEnd type="triangle"/>
+            <a:tailEnd type="none"/>
+          </a:ln>
+        </p:spPr>
+        <p:style>
+          <a:lnRef idx="3">
+            <a:schemeClr val="dk1"/>
+          </a:lnRef>
+          <a:fillRef idx="0">
+            <a:schemeClr val="dk1"/>
+          </a:fillRef>
+          <a:effectRef idx="2">
+            <a:schemeClr val="dk1"/>
+          </a:effectRef>
+          <a:fontRef idx="minor">
+            <a:schemeClr val="tx1"/>
+          </a:fontRef>
+        </p:style>
+      </p:cxnSp>
+      <p:sp>
+        <p:nvSpPr>
+          <p:cNvPr id="8" name="TextBox 7">
+            <a:extLst>
+              <a:ext uri="{FF2B5EF4-FFF2-40B4-BE49-F238E27FC236}">
+                <a16:creationId xmlns:a16="http://schemas.microsoft.com/office/drawing/2014/main" id="{423168B1-82C6-3745-8220-F394426F0CF0}"/>
+              </a:ext>
+            </a:extLst>
+          </p:cNvPr>
+          <p:cNvSpPr txBox="1"/>
+          <p:nvPr/>
+        </p:nvSpPr>
+        <p:spPr>
+          <a:xfrm>
+            <a:off x="2606617" y="1150595"/>
+            <a:ext cx="2058977" cy="369332"/>
+          </a:xfrm>
+          <a:prstGeom prst="rect">
+            <a:avLst/>
+          </a:prstGeom>
+          <a:noFill/>
+        </p:spPr>
+        <p:txBody>
+          <a:bodyPr wrap="square" rtlCol="0">
+            <a:spAutoFit/>
+          </a:bodyPr>
+          <a:lstStyle/>
+          <a:p>
+            <a:pPr algn="ctr"/>
+            <a:r>
+              <a:rPr lang="en-US" dirty="0" err="1"/>
+              <a:t>OperationOutcome</a:t>
+            </a:r>
+            <a:endParaRPr lang="en-US" dirty="0"/>
+          </a:p>
+        </p:txBody>
+      </p:sp>
+    </p:spTree>
+    <p:extLst>
+      <p:ext uri="{BB962C8B-B14F-4D97-AF65-F5344CB8AC3E}">
+        <p14:creationId xmlns:p14="http://schemas.microsoft.com/office/powerpoint/2010/main" val="3493001788"/>
+      </p:ext>
+    </p:extLst>
+  </p:cSld>
+  <p:clrMapOvr>
+    <a:masterClrMapping/>
+  </p:clrMapOvr>
+</p:sld>
+</file>
+
+<file path=ppt/slides/slide5.xml><?xml version="1.0" encoding="utf-8"?>
+<p:sld xmlns:a="http://schemas.openxmlformats.org/drawingml/2006/main" xmlns:r="http://schemas.openxmlformats.org/officeDocument/2006/relationships" xmlns:p="http://schemas.openxmlformats.org/presentationml/2006/main">
+  <p:cSld>
+    <p:spTree>
+      <p:nvGrpSpPr>
+        <p:cNvPr id="1" name=""/>
+        <p:cNvGrpSpPr/>
+        <p:nvPr/>
+      </p:nvGrpSpPr>
+      <p:grpSpPr>
+        <a:xfrm>
+          <a:off x="0" y="0"/>
+          <a:ext cx="0" cy="0"/>
+          <a:chOff x="0" y="0"/>
+          <a:chExt cx="0" cy="0"/>
+        </a:xfrm>
+      </p:grpSpPr>
+      <p:sp>
+        <p:nvSpPr>
+          <p:cNvPr id="4" name="Rounded Rectangle 3">
+            <a:extLst>
+              <a:ext uri="{FF2B5EF4-FFF2-40B4-BE49-F238E27FC236}">
+                <a16:creationId xmlns:a16="http://schemas.microsoft.com/office/drawing/2014/main" id="{A05A443F-C73B-3C4E-A56B-17CE4938DC22}"/>
+              </a:ext>
+            </a:extLst>
+          </p:cNvPr>
+          <p:cNvSpPr/>
+          <p:nvPr/>
+        </p:nvSpPr>
+        <p:spPr>
+          <a:xfrm>
+            <a:off x="910424" y="548640"/>
+            <a:ext cx="1439876" cy="731520"/>
+          </a:xfrm>
+          <a:prstGeom prst="roundRect">
+            <a:avLst/>
+          </a:prstGeom>
+        </p:spPr>
+        <p:style>
+          <a:lnRef idx="2">
+            <a:schemeClr val="accent5">
+              <a:shade val="50000"/>
+            </a:schemeClr>
+          </a:lnRef>
+          <a:fillRef idx="1">
+            <a:schemeClr val="accent5"/>
+          </a:fillRef>
+          <a:effectRef idx="0">
+            <a:schemeClr val="accent5"/>
+          </a:effectRef>
+          <a:fontRef idx="minor">
+            <a:schemeClr val="lt1"/>
+          </a:fontRef>
+        </p:style>
+        <p:txBody>
+          <a:bodyPr rtlCol="0" anchor="ctr"/>
+          <a:lstStyle/>
+          <a:p>
+            <a:pPr algn="ctr"/>
+            <a:r>
+              <a:rPr lang="en-US" dirty="0"/>
+              <a:t>Consumer</a:t>
+            </a:r>
+          </a:p>
+        </p:txBody>
+      </p:sp>
+      <p:sp>
+        <p:nvSpPr>
+          <p:cNvPr id="5" name="Rounded Rectangle 4">
+            <a:extLst>
+              <a:ext uri="{FF2B5EF4-FFF2-40B4-BE49-F238E27FC236}">
+                <a16:creationId xmlns:a16="http://schemas.microsoft.com/office/drawing/2014/main" id="{D4BB50DF-3901-5349-8E31-9DFE5D280A4C}"/>
+              </a:ext>
+            </a:extLst>
+          </p:cNvPr>
+          <p:cNvSpPr/>
+          <p:nvPr/>
+        </p:nvSpPr>
+        <p:spPr>
+          <a:xfrm>
+            <a:off x="4937760" y="548640"/>
+            <a:ext cx="1439876" cy="731520"/>
+          </a:xfrm>
+          <a:prstGeom prst="roundRect">
+            <a:avLst/>
+          </a:prstGeom>
+        </p:spPr>
+        <p:style>
+          <a:lnRef idx="2">
+            <a:schemeClr val="accent5">
+              <a:shade val="50000"/>
+            </a:schemeClr>
+          </a:lnRef>
+          <a:fillRef idx="1">
+            <a:schemeClr val="accent5"/>
+          </a:fillRef>
+          <a:effectRef idx="0">
+            <a:schemeClr val="accent5"/>
+          </a:effectRef>
+          <a:fontRef idx="minor">
+            <a:schemeClr val="lt1"/>
+          </a:fontRef>
+        </p:style>
+        <p:txBody>
+          <a:bodyPr rtlCol="0" anchor="ctr"/>
+          <a:lstStyle/>
+          <a:p>
+            <a:pPr algn="ctr"/>
+            <a:r>
+              <a:rPr lang="en-US" dirty="0"/>
+              <a:t>Producer</a:t>
+            </a:r>
+          </a:p>
+        </p:txBody>
+      </p:sp>
+      <p:cxnSp>
+        <p:nvCxnSpPr>
+          <p:cNvPr id="7" name="Straight Arrow Connector 6">
+            <a:extLst>
+              <a:ext uri="{FF2B5EF4-FFF2-40B4-BE49-F238E27FC236}">
+                <a16:creationId xmlns:a16="http://schemas.microsoft.com/office/drawing/2014/main" id="{E55F4871-6783-394B-BD80-7A2ADA301F18}"/>
+              </a:ext>
+            </a:extLst>
+          </p:cNvPr>
+          <p:cNvCxnSpPr>
+            <a:cxnSpLocks/>
+          </p:cNvCxnSpPr>
+          <p:nvPr/>
+        </p:nvCxnSpPr>
+        <p:spPr>
+          <a:xfrm>
+            <a:off x="2512339" y="808291"/>
+            <a:ext cx="2320684" cy="0"/>
+          </a:xfrm>
+          <a:prstGeom prst="straightConnector1">
+            <a:avLst/>
+          </a:prstGeom>
+          <a:ln w="63500">
+            <a:tailEnd type="triangle"/>
+          </a:ln>
+        </p:spPr>
+        <p:style>
+          <a:lnRef idx="3">
+            <a:schemeClr val="dk1"/>
+          </a:lnRef>
+          <a:fillRef idx="0">
+            <a:schemeClr val="dk1"/>
+          </a:fillRef>
+          <a:effectRef idx="2">
+            <a:schemeClr val="dk1"/>
+          </a:effectRef>
+          <a:fontRef idx="minor">
+            <a:schemeClr val="tx1"/>
+          </a:fontRef>
+        </p:style>
+      </p:cxnSp>
+      <p:sp>
+        <p:nvSpPr>
+          <p:cNvPr id="9" name="TextBox 8">
+            <a:extLst>
+              <a:ext uri="{FF2B5EF4-FFF2-40B4-BE49-F238E27FC236}">
+                <a16:creationId xmlns:a16="http://schemas.microsoft.com/office/drawing/2014/main" id="{78938667-68DC-824C-BFCC-43F9EE407867}"/>
+              </a:ext>
+            </a:extLst>
+          </p:cNvPr>
+          <p:cNvSpPr txBox="1"/>
+          <p:nvPr/>
+        </p:nvSpPr>
+        <p:spPr>
+          <a:xfrm>
+            <a:off x="2674908" y="374385"/>
+            <a:ext cx="1922394" cy="369332"/>
+          </a:xfrm>
+          <a:prstGeom prst="rect">
+            <a:avLst/>
+          </a:prstGeom>
+          <a:noFill/>
+        </p:spPr>
+        <p:txBody>
+          <a:bodyPr wrap="square" rtlCol="0">
+            <a:spAutoFit/>
+          </a:bodyPr>
+          <a:lstStyle/>
+          <a:p>
+            <a:pPr algn="ctr"/>
+            <a:r>
+              <a:rPr lang="en-US" dirty="0"/>
+              <a:t>Collect CQM Data</a:t>
+            </a:r>
+          </a:p>
+        </p:txBody>
+      </p:sp>
+      <p:cxnSp>
+        <p:nvCxnSpPr>
+          <p:cNvPr id="6" name="Straight Arrow Connector 5">
+            <a:extLst>
+              <a:ext uri="{FF2B5EF4-FFF2-40B4-BE49-F238E27FC236}">
+                <a16:creationId xmlns:a16="http://schemas.microsoft.com/office/drawing/2014/main" id="{E139EF16-53B7-E144-9F8F-2BA3DB3D4F1D}"/>
+              </a:ext>
+            </a:extLst>
+          </p:cNvPr>
+          <p:cNvCxnSpPr>
+            <a:cxnSpLocks/>
+          </p:cNvCxnSpPr>
+          <p:nvPr/>
+        </p:nvCxnSpPr>
+        <p:spPr>
+          <a:xfrm>
+            <a:off x="2475764" y="1048473"/>
+            <a:ext cx="2320684" cy="0"/>
+          </a:xfrm>
+          <a:prstGeom prst="straightConnector1">
+            <a:avLst/>
+          </a:prstGeom>
+          <a:ln w="63500">
+            <a:headEnd type="triangle"/>
+            <a:tailEnd type="none"/>
+          </a:ln>
+        </p:spPr>
+        <p:style>
+          <a:lnRef idx="3">
+            <a:schemeClr val="dk1"/>
+          </a:lnRef>
+          <a:fillRef idx="0">
+            <a:schemeClr val="dk1"/>
+          </a:fillRef>
+          <a:effectRef idx="2">
+            <a:schemeClr val="dk1"/>
+          </a:effectRef>
+          <a:fontRef idx="minor">
+            <a:schemeClr val="tx1"/>
+          </a:fontRef>
+        </p:style>
+      </p:cxnSp>
+      <p:sp>
+        <p:nvSpPr>
+          <p:cNvPr id="8" name="TextBox 7">
+            <a:extLst>
+              <a:ext uri="{FF2B5EF4-FFF2-40B4-BE49-F238E27FC236}">
+                <a16:creationId xmlns:a16="http://schemas.microsoft.com/office/drawing/2014/main" id="{423168B1-82C6-3745-8220-F394426F0CF0}"/>
+              </a:ext>
+            </a:extLst>
+          </p:cNvPr>
+          <p:cNvSpPr txBox="1"/>
+          <p:nvPr/>
+        </p:nvSpPr>
+        <p:spPr>
+          <a:xfrm>
+            <a:off x="2606617" y="1150595"/>
+            <a:ext cx="2058977" cy="369332"/>
+          </a:xfrm>
+          <a:prstGeom prst="rect">
+            <a:avLst/>
+          </a:prstGeom>
+          <a:noFill/>
+        </p:spPr>
+        <p:txBody>
+          <a:bodyPr wrap="square" rtlCol="0">
+            <a:spAutoFit/>
+          </a:bodyPr>
+          <a:lstStyle/>
+          <a:p>
+            <a:pPr algn="ctr"/>
+            <a:r>
+              <a:rPr lang="en-US" dirty="0" err="1"/>
+              <a:t>OperationOutcome</a:t>
+            </a:r>
+            <a:endParaRPr lang="en-US" dirty="0"/>
+          </a:p>
+        </p:txBody>
+      </p:sp>
+    </p:spTree>
+    <p:extLst>
+      <p:ext uri="{BB962C8B-B14F-4D97-AF65-F5344CB8AC3E}">
+        <p14:creationId xmlns:p14="http://schemas.microsoft.com/office/powerpoint/2010/main" val="2874288807"/>
+      </p:ext>
+    </p:extLst>
+  </p:cSld>
+  <p:clrMapOvr>
+    <a:masterClrMapping/>
+  </p:clrMapOvr>
+</p:sld>
+</file>
+
+<file path=ppt/slides/slide6.xml><?xml version="1.0" encoding="utf-8"?>
+<p:sld xmlns:a="http://schemas.openxmlformats.org/drawingml/2006/main" xmlns:r="http://schemas.openxmlformats.org/officeDocument/2006/relationships" xmlns:p="http://schemas.openxmlformats.org/presentationml/2006/main">
+  <p:cSld>
+    <p:spTree>
+      <p:nvGrpSpPr>
+        <p:cNvPr id="1" name=""/>
+        <p:cNvGrpSpPr/>
+        <p:nvPr/>
+      </p:nvGrpSpPr>
+      <p:grpSpPr>
+        <a:xfrm>
+          <a:off x="0" y="0"/>
+          <a:ext cx="0" cy="0"/>
+          <a:chOff x="0" y="0"/>
+          <a:chExt cx="0" cy="0"/>
+        </a:xfrm>
+      </p:grpSpPr>
+      <p:sp>
+        <p:nvSpPr>
+          <p:cNvPr id="4" name="Rounded Rectangle 3">
+            <a:extLst>
+              <a:ext uri="{FF2B5EF4-FFF2-40B4-BE49-F238E27FC236}">
+                <a16:creationId xmlns:a16="http://schemas.microsoft.com/office/drawing/2014/main" id="{A05A443F-C73B-3C4E-A56B-17CE4938DC22}"/>
+              </a:ext>
+            </a:extLst>
+          </p:cNvPr>
+          <p:cNvSpPr/>
+          <p:nvPr/>
+        </p:nvSpPr>
+        <p:spPr>
+          <a:xfrm>
+            <a:off x="910424" y="548640"/>
+            <a:ext cx="1439876" cy="731520"/>
+          </a:xfrm>
+          <a:prstGeom prst="roundRect">
+            <a:avLst/>
+          </a:prstGeom>
+        </p:spPr>
+        <p:style>
+          <a:lnRef idx="2">
+            <a:schemeClr val="accent5">
+              <a:shade val="50000"/>
+            </a:schemeClr>
+          </a:lnRef>
+          <a:fillRef idx="1">
+            <a:schemeClr val="accent5"/>
+          </a:fillRef>
+          <a:effectRef idx="0">
+            <a:schemeClr val="accent5"/>
+          </a:effectRef>
+          <a:fontRef idx="minor">
+            <a:schemeClr val="lt1"/>
+          </a:fontRef>
+        </p:style>
+        <p:txBody>
+          <a:bodyPr rtlCol="0" anchor="ctr"/>
+          <a:lstStyle/>
+          <a:p>
+            <a:pPr algn="ctr"/>
+            <a:r>
+              <a:rPr lang="en-US" dirty="0"/>
+              <a:t>Consumer</a:t>
+            </a:r>
+          </a:p>
+        </p:txBody>
+      </p:sp>
+      <p:sp>
+        <p:nvSpPr>
+          <p:cNvPr id="5" name="Rounded Rectangle 4">
+            <a:extLst>
+              <a:ext uri="{FF2B5EF4-FFF2-40B4-BE49-F238E27FC236}">
+                <a16:creationId xmlns:a16="http://schemas.microsoft.com/office/drawing/2014/main" id="{D4BB50DF-3901-5349-8E31-9DFE5D280A4C}"/>
+              </a:ext>
+            </a:extLst>
+          </p:cNvPr>
+          <p:cNvSpPr/>
+          <p:nvPr/>
+        </p:nvSpPr>
+        <p:spPr>
+          <a:xfrm>
+            <a:off x="4937760" y="548640"/>
+            <a:ext cx="1439876" cy="731520"/>
+          </a:xfrm>
+          <a:prstGeom prst="roundRect">
+            <a:avLst/>
+          </a:prstGeom>
+        </p:spPr>
+        <p:style>
+          <a:lnRef idx="2">
+            <a:schemeClr val="accent5">
+              <a:shade val="50000"/>
+            </a:schemeClr>
+          </a:lnRef>
+          <a:fillRef idx="1">
+            <a:schemeClr val="accent5"/>
+          </a:fillRef>
+          <a:effectRef idx="0">
+            <a:schemeClr val="accent5"/>
+          </a:effectRef>
+          <a:fontRef idx="minor">
+            <a:schemeClr val="lt1"/>
+          </a:fontRef>
+        </p:style>
+        <p:txBody>
+          <a:bodyPr rtlCol="0" anchor="ctr"/>
+          <a:lstStyle/>
+          <a:p>
+            <a:pPr algn="ctr"/>
+            <a:r>
+              <a:rPr lang="en-US" dirty="0"/>
+              <a:t>Producer</a:t>
+            </a:r>
+          </a:p>
+        </p:txBody>
+      </p:sp>
+      <p:cxnSp>
+        <p:nvCxnSpPr>
+          <p:cNvPr id="7" name="Straight Arrow Connector 6">
+            <a:extLst>
+              <a:ext uri="{FF2B5EF4-FFF2-40B4-BE49-F238E27FC236}">
+                <a16:creationId xmlns:a16="http://schemas.microsoft.com/office/drawing/2014/main" id="{E55F4871-6783-394B-BD80-7A2ADA301F18}"/>
+              </a:ext>
+            </a:extLst>
+          </p:cNvPr>
+          <p:cNvCxnSpPr>
+            <a:cxnSpLocks/>
+          </p:cNvCxnSpPr>
+          <p:nvPr/>
+        </p:nvCxnSpPr>
+        <p:spPr>
+          <a:xfrm>
+            <a:off x="2512339" y="808291"/>
+            <a:ext cx="2320684" cy="0"/>
+          </a:xfrm>
+          <a:prstGeom prst="straightConnector1">
+            <a:avLst/>
+          </a:prstGeom>
+          <a:ln w="63500">
+            <a:tailEnd type="triangle"/>
+          </a:ln>
+        </p:spPr>
+        <p:style>
+          <a:lnRef idx="3">
+            <a:schemeClr val="dk1"/>
+          </a:lnRef>
+          <a:fillRef idx="0">
+            <a:schemeClr val="dk1"/>
+          </a:fillRef>
+          <a:effectRef idx="2">
+            <a:schemeClr val="dk1"/>
+          </a:effectRef>
+          <a:fontRef idx="minor">
+            <a:schemeClr val="tx1"/>
+          </a:fontRef>
+        </p:style>
+      </p:cxnSp>
+      <p:sp>
+        <p:nvSpPr>
+          <p:cNvPr id="9" name="TextBox 8">
+            <a:extLst>
+              <a:ext uri="{FF2B5EF4-FFF2-40B4-BE49-F238E27FC236}">
+                <a16:creationId xmlns:a16="http://schemas.microsoft.com/office/drawing/2014/main" id="{78938667-68DC-824C-BFCC-43F9EE407867}"/>
+              </a:ext>
+            </a:extLst>
+          </p:cNvPr>
+          <p:cNvSpPr txBox="1"/>
+          <p:nvPr/>
+        </p:nvSpPr>
+        <p:spPr>
+          <a:xfrm>
+            <a:off x="2475764" y="132860"/>
+            <a:ext cx="2262852" cy="646331"/>
+          </a:xfrm>
+          <a:prstGeom prst="rect">
+            <a:avLst/>
+          </a:prstGeom>
+          <a:noFill/>
+        </p:spPr>
+        <p:txBody>
+          <a:bodyPr wrap="square" rtlCol="0">
+            <a:spAutoFit/>
+          </a:bodyPr>
+          <a:lstStyle/>
+          <a:p>
+            <a:pPr algn="ctr"/>
+            <a:r>
+              <a:rPr lang="en-US" dirty="0"/>
+              <a:t>Subscribe for CQM Data</a:t>
+            </a:r>
+          </a:p>
+        </p:txBody>
+      </p:sp>
+      <p:cxnSp>
+        <p:nvCxnSpPr>
+          <p:cNvPr id="6" name="Straight Arrow Connector 5">
+            <a:extLst>
+              <a:ext uri="{FF2B5EF4-FFF2-40B4-BE49-F238E27FC236}">
+                <a16:creationId xmlns:a16="http://schemas.microsoft.com/office/drawing/2014/main" id="{E139EF16-53B7-E144-9F8F-2BA3DB3D4F1D}"/>
+              </a:ext>
+            </a:extLst>
+          </p:cNvPr>
+          <p:cNvCxnSpPr>
+            <a:cxnSpLocks/>
+          </p:cNvCxnSpPr>
+          <p:nvPr/>
+        </p:nvCxnSpPr>
+        <p:spPr>
+          <a:xfrm>
+            <a:off x="2475764" y="1048473"/>
+            <a:ext cx="2320684" cy="0"/>
+          </a:xfrm>
+          <a:prstGeom prst="straightConnector1">
+            <a:avLst/>
+          </a:prstGeom>
+          <a:ln w="63500">
+            <a:headEnd type="triangle"/>
+            <a:tailEnd type="none"/>
+          </a:ln>
+        </p:spPr>
+        <p:style>
+          <a:lnRef idx="3">
+            <a:schemeClr val="dk1"/>
+          </a:lnRef>
+          <a:fillRef idx="0">
+            <a:schemeClr val="dk1"/>
+          </a:fillRef>
+          <a:effectRef idx="2">
+            <a:schemeClr val="dk1"/>
+          </a:effectRef>
+          <a:fontRef idx="minor">
+            <a:schemeClr val="tx1"/>
+          </a:fontRef>
+        </p:style>
+      </p:cxnSp>
+      <p:sp>
+        <p:nvSpPr>
+          <p:cNvPr id="8" name="TextBox 7">
+            <a:extLst>
+              <a:ext uri="{FF2B5EF4-FFF2-40B4-BE49-F238E27FC236}">
+                <a16:creationId xmlns:a16="http://schemas.microsoft.com/office/drawing/2014/main" id="{423168B1-82C6-3745-8220-F394426F0CF0}"/>
+              </a:ext>
+            </a:extLst>
+          </p:cNvPr>
+          <p:cNvSpPr txBox="1"/>
+          <p:nvPr/>
+        </p:nvSpPr>
+        <p:spPr>
+          <a:xfrm>
+            <a:off x="2643192" y="1156239"/>
+            <a:ext cx="2058977" cy="369332"/>
+          </a:xfrm>
+          <a:prstGeom prst="rect">
+            <a:avLst/>
+          </a:prstGeom>
+          <a:noFill/>
+        </p:spPr>
+        <p:txBody>
+          <a:bodyPr wrap="square" rtlCol="0">
+            <a:spAutoFit/>
+          </a:bodyPr>
+          <a:lstStyle/>
+          <a:p>
+            <a:pPr algn="ctr"/>
+            <a:r>
+              <a:rPr lang="en-US" dirty="0" err="1"/>
+              <a:t>OperationOutcome</a:t>
+            </a:r>
+            <a:endParaRPr lang="en-US" dirty="0"/>
+          </a:p>
+        </p:txBody>
+      </p:sp>
+    </p:spTree>
+    <p:extLst>
+      <p:ext uri="{BB962C8B-B14F-4D97-AF65-F5344CB8AC3E}">
+        <p14:creationId xmlns:p14="http://schemas.microsoft.com/office/powerpoint/2010/main" val="2112061221"/>
+      </p:ext>
+    </p:extLst>
+  </p:cSld>
+  <p:clrMapOvr>
+    <a:masterClrMapping/>
+  </p:clrMapOvr>
+</p:sld>
+</file>
+
+<file path=ppt/slides/slide7.xml><?xml version="1.0" encoding="utf-8"?>
+<p:sld xmlns:a="http://schemas.openxmlformats.org/drawingml/2006/main" xmlns:r="http://schemas.openxmlformats.org/officeDocument/2006/relationships" xmlns:p="http://schemas.openxmlformats.org/presentationml/2006/main">
+  <p:cSld>
+    <p:spTree>
+      <p:nvGrpSpPr>
+        <p:cNvPr id="1" name=""/>
+        <p:cNvGrpSpPr/>
+        <p:nvPr/>
+      </p:nvGrpSpPr>
+      <p:grpSpPr>
+        <a:xfrm>
+          <a:off x="0" y="0"/>
+          <a:ext cx="0" cy="0"/>
+          <a:chOff x="0" y="0"/>
+          <a:chExt cx="0" cy="0"/>
+        </a:xfrm>
+      </p:grpSpPr>
+      <p:sp>
+        <p:nvSpPr>
+          <p:cNvPr id="4" name="Rounded Rectangle 3">
+            <a:extLst>
+              <a:ext uri="{FF2B5EF4-FFF2-40B4-BE49-F238E27FC236}">
+                <a16:creationId xmlns:a16="http://schemas.microsoft.com/office/drawing/2014/main" id="{A05A443F-C73B-3C4E-A56B-17CE4938DC22}"/>
+              </a:ext>
+            </a:extLst>
+          </p:cNvPr>
+          <p:cNvSpPr/>
+          <p:nvPr/>
+        </p:nvSpPr>
+        <p:spPr>
+          <a:xfrm>
+            <a:off x="910424" y="548640"/>
+            <a:ext cx="1439876" cy="731520"/>
+          </a:xfrm>
+          <a:prstGeom prst="roundRect">
+            <a:avLst/>
+          </a:prstGeom>
+        </p:spPr>
+        <p:style>
+          <a:lnRef idx="2">
+            <a:schemeClr val="accent5">
+              <a:shade val="50000"/>
+            </a:schemeClr>
+          </a:lnRef>
+          <a:fillRef idx="1">
+            <a:schemeClr val="accent5"/>
+          </a:fillRef>
+          <a:effectRef idx="0">
+            <a:schemeClr val="accent5"/>
+          </a:effectRef>
+          <a:fontRef idx="minor">
+            <a:schemeClr val="lt1"/>
+          </a:fontRef>
+        </p:style>
+        <p:txBody>
+          <a:bodyPr rtlCol="0" anchor="ctr"/>
+          <a:lstStyle/>
+          <a:p>
+            <a:pPr algn="ctr"/>
+            <a:r>
+              <a:rPr lang="en-US" dirty="0"/>
+              <a:t>Consumer</a:t>
+            </a:r>
+          </a:p>
+        </p:txBody>
+      </p:sp>
+      <p:sp>
+        <p:nvSpPr>
+          <p:cNvPr id="5" name="Rounded Rectangle 4">
+            <a:extLst>
+              <a:ext uri="{FF2B5EF4-FFF2-40B4-BE49-F238E27FC236}">
+                <a16:creationId xmlns:a16="http://schemas.microsoft.com/office/drawing/2014/main" id="{D4BB50DF-3901-5349-8E31-9DFE5D280A4C}"/>
+              </a:ext>
+            </a:extLst>
+          </p:cNvPr>
+          <p:cNvSpPr/>
+          <p:nvPr/>
+        </p:nvSpPr>
+        <p:spPr>
+          <a:xfrm>
+            <a:off x="4937760" y="548640"/>
+            <a:ext cx="1439876" cy="731520"/>
+          </a:xfrm>
+          <a:prstGeom prst="roundRect">
+            <a:avLst/>
+          </a:prstGeom>
+        </p:spPr>
+        <p:style>
+          <a:lnRef idx="2">
+            <a:schemeClr val="accent5">
+              <a:shade val="50000"/>
+            </a:schemeClr>
+          </a:lnRef>
+          <a:fillRef idx="1">
+            <a:schemeClr val="accent5"/>
+          </a:fillRef>
+          <a:effectRef idx="0">
+            <a:schemeClr val="accent5"/>
+          </a:effectRef>
+          <a:fontRef idx="minor">
+            <a:schemeClr val="lt1"/>
+          </a:fontRef>
+        </p:style>
+        <p:txBody>
+          <a:bodyPr rtlCol="0" anchor="ctr"/>
+          <a:lstStyle/>
+          <a:p>
+            <a:pPr algn="ctr"/>
+            <a:r>
+              <a:rPr lang="en-US" dirty="0"/>
+              <a:t>Producer</a:t>
+            </a:r>
+          </a:p>
+        </p:txBody>
+      </p:sp>
+      <p:sp>
+        <p:nvSpPr>
+          <p:cNvPr id="8" name="TextBox 7">
+            <a:extLst>
+              <a:ext uri="{FF2B5EF4-FFF2-40B4-BE49-F238E27FC236}">
+                <a16:creationId xmlns:a16="http://schemas.microsoft.com/office/drawing/2014/main" id="{423168B1-82C6-3745-8220-F394426F0CF0}"/>
+              </a:ext>
+            </a:extLst>
+          </p:cNvPr>
+          <p:cNvSpPr txBox="1"/>
+          <p:nvPr/>
+        </p:nvSpPr>
+        <p:spPr>
+          <a:xfrm>
+            <a:off x="2191486" y="284203"/>
+            <a:ext cx="2746274" cy="369332"/>
+          </a:xfrm>
+          <a:prstGeom prst="rect">
+            <a:avLst/>
+          </a:prstGeom>
+          <a:noFill/>
+        </p:spPr>
+        <p:txBody>
+          <a:bodyPr wrap="square" rtlCol="0">
+            <a:spAutoFit/>
+          </a:bodyPr>
+          <a:lstStyle/>
+          <a:p>
+            <a:pPr algn="ctr"/>
+            <a:r>
+              <a:rPr lang="en-US" dirty="0"/>
+              <a:t>CQM Data Notifications</a:t>
+            </a:r>
+          </a:p>
+        </p:txBody>
+      </p:sp>
+      <p:grpSp>
+        <p:nvGrpSpPr>
+          <p:cNvPr id="17" name="Group 16">
+            <a:extLst>
+              <a:ext uri="{FF2B5EF4-FFF2-40B4-BE49-F238E27FC236}">
+                <a16:creationId xmlns:a16="http://schemas.microsoft.com/office/drawing/2014/main" id="{DCC4B3B5-E3D4-F346-B014-EC1652CF247B}"/>
+              </a:ext>
+            </a:extLst>
+          </p:cNvPr>
+          <p:cNvGrpSpPr/>
+          <p:nvPr/>
+        </p:nvGrpSpPr>
+        <p:grpSpPr>
+          <a:xfrm>
+            <a:off x="2390789" y="762000"/>
+            <a:ext cx="2506481" cy="304800"/>
+            <a:chOff x="2364553" y="760606"/>
+            <a:chExt cx="2625484" cy="304800"/>
+          </a:xfrm>
+        </p:grpSpPr>
+        <p:cxnSp>
+          <p:nvCxnSpPr>
+            <p:cNvPr id="11" name="Straight Arrow Connector 10">
+              <a:extLst>
+                <a:ext uri="{FF2B5EF4-FFF2-40B4-BE49-F238E27FC236}">
+                  <a16:creationId xmlns:a16="http://schemas.microsoft.com/office/drawing/2014/main" id="{88338E36-0F87-EE4E-ADC5-54B8B34A7566}"/>
+                </a:ext>
+              </a:extLst>
+            </p:cNvPr>
+            <p:cNvCxnSpPr>
+              <a:cxnSpLocks/>
+            </p:cNvCxnSpPr>
+            <p:nvPr/>
+          </p:nvCxnSpPr>
+          <p:spPr>
+            <a:xfrm>
+              <a:off x="2364553" y="760606"/>
+              <a:ext cx="2320684" cy="0"/>
+            </a:xfrm>
+            <a:prstGeom prst="straightConnector1">
+              <a:avLst/>
+            </a:prstGeom>
+            <a:ln w="63500">
+              <a:headEnd type="triangle"/>
+              <a:tailEnd type="none"/>
+            </a:ln>
+          </p:spPr>
+          <p:style>
+            <a:lnRef idx="3">
+              <a:schemeClr val="dk1"/>
+            </a:lnRef>
+            <a:fillRef idx="0">
+              <a:schemeClr val="dk1"/>
+            </a:fillRef>
+            <a:effectRef idx="2">
+              <a:schemeClr val="dk1"/>
+            </a:effectRef>
+            <a:fontRef idx="minor">
+              <a:schemeClr val="tx1"/>
+            </a:fontRef>
+          </p:style>
+        </p:cxnSp>
+        <p:cxnSp>
+          <p:nvCxnSpPr>
+            <p:cNvPr id="12" name="Straight Arrow Connector 11">
+              <a:extLst>
+                <a:ext uri="{FF2B5EF4-FFF2-40B4-BE49-F238E27FC236}">
+                  <a16:creationId xmlns:a16="http://schemas.microsoft.com/office/drawing/2014/main" id="{106990B6-8E89-AA4A-8106-AF608BD8F14A}"/>
+                </a:ext>
+              </a:extLst>
+            </p:cNvPr>
+            <p:cNvCxnSpPr>
+              <a:cxnSpLocks/>
+            </p:cNvCxnSpPr>
+            <p:nvPr/>
+          </p:nvCxnSpPr>
+          <p:spPr>
+            <a:xfrm>
+              <a:off x="2516953" y="913006"/>
+              <a:ext cx="2320684" cy="0"/>
+            </a:xfrm>
+            <a:prstGeom prst="straightConnector1">
+              <a:avLst/>
+            </a:prstGeom>
+            <a:ln w="63500">
+              <a:headEnd type="triangle"/>
+              <a:tailEnd type="none"/>
+            </a:ln>
+          </p:spPr>
+          <p:style>
+            <a:lnRef idx="3">
+              <a:schemeClr val="dk1"/>
+            </a:lnRef>
+            <a:fillRef idx="0">
+              <a:schemeClr val="dk1"/>
+            </a:fillRef>
+            <a:effectRef idx="2">
+              <a:schemeClr val="dk1"/>
+            </a:effectRef>
+            <a:fontRef idx="minor">
+              <a:schemeClr val="tx1"/>
+            </a:fontRef>
+          </p:style>
+        </p:cxnSp>
+        <p:cxnSp>
+          <p:nvCxnSpPr>
+            <p:cNvPr id="13" name="Straight Arrow Connector 12">
+              <a:extLst>
+                <a:ext uri="{FF2B5EF4-FFF2-40B4-BE49-F238E27FC236}">
+                  <a16:creationId xmlns:a16="http://schemas.microsoft.com/office/drawing/2014/main" id="{A3C108E4-DC54-734C-BC37-D22169094DE6}"/>
+                </a:ext>
+              </a:extLst>
+            </p:cNvPr>
+            <p:cNvCxnSpPr>
+              <a:cxnSpLocks/>
+            </p:cNvCxnSpPr>
+            <p:nvPr/>
+          </p:nvCxnSpPr>
+          <p:spPr>
+            <a:xfrm>
+              <a:off x="2669353" y="1065406"/>
+              <a:ext cx="2320684" cy="0"/>
+            </a:xfrm>
+            <a:prstGeom prst="straightConnector1">
+              <a:avLst/>
+            </a:prstGeom>
+            <a:ln w="63500">
+              <a:headEnd type="triangle"/>
+              <a:tailEnd type="none"/>
+            </a:ln>
+          </p:spPr>
+          <p:style>
+            <a:lnRef idx="3">
+              <a:schemeClr val="dk1"/>
+            </a:lnRef>
+            <a:fillRef idx="0">
+              <a:schemeClr val="dk1"/>
+            </a:fillRef>
+            <a:effectRef idx="2">
+              <a:schemeClr val="dk1"/>
+            </a:effectRef>
+            <a:fontRef idx="minor">
+              <a:schemeClr val="tx1"/>
+            </a:fontRef>
+          </p:style>
+        </p:cxnSp>
+      </p:grpSp>
+    </p:spTree>
+    <p:extLst>
+      <p:ext uri="{BB962C8B-B14F-4D97-AF65-F5344CB8AC3E}">
+        <p14:creationId xmlns:p14="http://schemas.microsoft.com/office/powerpoint/2010/main" val="3808913143"/>
       </p:ext>
     </p:extLst>
   </p:cSld>

</xml_diff>